<commit_message>
add ref from ppt
</commit_message>
<xml_diff>
--- a/final_Project/시스템 프로그래밍 기말 발표.pptx
+++ b/final_Project/시스템 프로그래밍 기말 발표.pptx
@@ -49,6 +49,7 @@
     <p:sldId id="292" r:id="rId43"/>
     <p:sldId id="293" r:id="rId44"/>
     <p:sldId id="299" r:id="rId45"/>
+    <p:sldId id="300" r:id="rId46"/>
   </p:sldIdLst>
   <p:sldSz cx="12192000" cy="6858000"/>
   <p:notesSz cx="6858000" cy="9144000"/>
@@ -147,6 +148,11 @@
       </a:defRPr>
     </a:lvl9pPr>
   </p:defaultTextStyle>
+  <p:extLst>
+    <p:ext uri="{EFAFB233-063F-42B5-8137-9DF3F51BA10A}">
+      <p15:sldGuideLst xmlns:p15="http://schemas.microsoft.com/office/powerpoint/2012/main"/>
+    </p:ext>
+  </p:extLst>
 </p:presentation>
 </file>
 
@@ -297,7 +303,7 @@
           <a:p>
             <a:fld id="{0722C14C-7FC3-48D5-A805-7B5BE1CFE858}" type="datetimeFigureOut">
               <a:rPr lang="ko-KR" altLang="en-US" smtClean="0"/>
-              <a:t>2023-06-08</a:t>
+              <a:t>2023-06-11</a:t>
             </a:fld>
             <a:endParaRPr lang="ko-KR" altLang="en-US"/>
           </a:p>
@@ -495,7 +501,7 @@
           <a:p>
             <a:fld id="{0722C14C-7FC3-48D5-A805-7B5BE1CFE858}" type="datetimeFigureOut">
               <a:rPr lang="ko-KR" altLang="en-US" smtClean="0"/>
-              <a:t>2023-06-08</a:t>
+              <a:t>2023-06-11</a:t>
             </a:fld>
             <a:endParaRPr lang="ko-KR" altLang="en-US"/>
           </a:p>
@@ -703,7 +709,7 @@
           <a:p>
             <a:fld id="{0722C14C-7FC3-48D5-A805-7B5BE1CFE858}" type="datetimeFigureOut">
               <a:rPr lang="ko-KR" altLang="en-US" smtClean="0"/>
-              <a:t>2023-06-08</a:t>
+              <a:t>2023-06-11</a:t>
             </a:fld>
             <a:endParaRPr lang="ko-KR" altLang="en-US"/>
           </a:p>
@@ -901,7 +907,7 @@
           <a:p>
             <a:fld id="{0722C14C-7FC3-48D5-A805-7B5BE1CFE858}" type="datetimeFigureOut">
               <a:rPr lang="ko-KR" altLang="en-US" smtClean="0"/>
-              <a:t>2023-06-08</a:t>
+              <a:t>2023-06-11</a:t>
             </a:fld>
             <a:endParaRPr lang="ko-KR" altLang="en-US"/>
           </a:p>
@@ -1176,7 +1182,7 @@
           <a:p>
             <a:fld id="{0722C14C-7FC3-48D5-A805-7B5BE1CFE858}" type="datetimeFigureOut">
               <a:rPr lang="ko-KR" altLang="en-US" smtClean="0"/>
-              <a:t>2023-06-08</a:t>
+              <a:t>2023-06-11</a:t>
             </a:fld>
             <a:endParaRPr lang="ko-KR" altLang="en-US"/>
           </a:p>
@@ -1441,7 +1447,7 @@
           <a:p>
             <a:fld id="{0722C14C-7FC3-48D5-A805-7B5BE1CFE858}" type="datetimeFigureOut">
               <a:rPr lang="ko-KR" altLang="en-US" smtClean="0"/>
-              <a:t>2023-06-08</a:t>
+              <a:t>2023-06-11</a:t>
             </a:fld>
             <a:endParaRPr lang="ko-KR" altLang="en-US"/>
           </a:p>
@@ -1853,7 +1859,7 @@
           <a:p>
             <a:fld id="{0722C14C-7FC3-48D5-A805-7B5BE1CFE858}" type="datetimeFigureOut">
               <a:rPr lang="ko-KR" altLang="en-US" smtClean="0"/>
-              <a:t>2023-06-08</a:t>
+              <a:t>2023-06-11</a:t>
             </a:fld>
             <a:endParaRPr lang="ko-KR" altLang="en-US"/>
           </a:p>
@@ -1994,7 +2000,7 @@
           <a:p>
             <a:fld id="{0722C14C-7FC3-48D5-A805-7B5BE1CFE858}" type="datetimeFigureOut">
               <a:rPr lang="ko-KR" altLang="en-US" smtClean="0"/>
-              <a:t>2023-06-08</a:t>
+              <a:t>2023-06-11</a:t>
             </a:fld>
             <a:endParaRPr lang="ko-KR" altLang="en-US"/>
           </a:p>
@@ -2107,7 +2113,7 @@
           <a:p>
             <a:fld id="{0722C14C-7FC3-48D5-A805-7B5BE1CFE858}" type="datetimeFigureOut">
               <a:rPr lang="ko-KR" altLang="en-US" smtClean="0"/>
-              <a:t>2023-06-08</a:t>
+              <a:t>2023-06-11</a:t>
             </a:fld>
             <a:endParaRPr lang="ko-KR" altLang="en-US"/>
           </a:p>
@@ -2418,7 +2424,7 @@
           <a:p>
             <a:fld id="{0722C14C-7FC3-48D5-A805-7B5BE1CFE858}" type="datetimeFigureOut">
               <a:rPr lang="ko-KR" altLang="en-US" smtClean="0"/>
-              <a:t>2023-06-08</a:t>
+              <a:t>2023-06-11</a:t>
             </a:fld>
             <a:endParaRPr lang="ko-KR" altLang="en-US"/>
           </a:p>
@@ -2706,7 +2712,7 @@
           <a:p>
             <a:fld id="{0722C14C-7FC3-48D5-A805-7B5BE1CFE858}" type="datetimeFigureOut">
               <a:rPr lang="ko-KR" altLang="en-US" smtClean="0"/>
-              <a:t>2023-06-08</a:t>
+              <a:t>2023-06-11</a:t>
             </a:fld>
             <a:endParaRPr lang="ko-KR" altLang="en-US"/>
           </a:p>
@@ -2947,7 +2953,7 @@
           <a:p>
             <a:fld id="{0722C14C-7FC3-48D5-A805-7B5BE1CFE858}" type="datetimeFigureOut">
               <a:rPr lang="ko-KR" altLang="en-US" smtClean="0"/>
-              <a:t>2023-06-08</a:t>
+              <a:t>2023-06-11</a:t>
             </a:fld>
             <a:endParaRPr lang="ko-KR" altLang="en-US"/>
           </a:p>
@@ -8223,6 +8229,125 @@
 </p:sld>
 </file>
 
+<file path=ppt/slides/slide45.xml><?xml version="1.0" encoding="utf-8"?>
+<p:sld xmlns:a="http://schemas.openxmlformats.org/drawingml/2006/main" xmlns:r="http://schemas.openxmlformats.org/officeDocument/2006/relationships" xmlns:p="http://schemas.openxmlformats.org/presentationml/2006/main">
+  <p:cSld>
+    <p:spTree>
+      <p:nvGrpSpPr>
+        <p:cNvPr id="1" name=""/>
+        <p:cNvGrpSpPr/>
+        <p:nvPr/>
+      </p:nvGrpSpPr>
+      <p:grpSpPr>
+        <a:xfrm>
+          <a:off x="0" y="0"/>
+          <a:ext cx="0" cy="0"/>
+          <a:chOff x="0" y="0"/>
+          <a:chExt cx="0" cy="0"/>
+        </a:xfrm>
+      </p:grpSpPr>
+      <p:sp>
+        <p:nvSpPr>
+          <p:cNvPr id="2" name="제목 1">
+            <a:extLst>
+              <a:ext uri="{FF2B5EF4-FFF2-40B4-BE49-F238E27FC236}">
+                <a16:creationId xmlns:a16="http://schemas.microsoft.com/office/drawing/2014/main" id="{01FBAAAF-0846-0214-A768-4E95CCE9B39B}"/>
+              </a:ext>
+            </a:extLst>
+          </p:cNvPr>
+          <p:cNvSpPr>
+            <a:spLocks noGrp="1"/>
+          </p:cNvSpPr>
+          <p:nvPr>
+            <p:ph type="title"/>
+          </p:nvPr>
+        </p:nvSpPr>
+        <p:spPr>
+          <a:xfrm>
+            <a:off x="838200" y="365125"/>
+            <a:ext cx="10515600" cy="6203455"/>
+          </a:xfrm>
+        </p:spPr>
+        <p:txBody>
+          <a:bodyPr>
+            <a:normAutofit/>
+          </a:bodyPr>
+          <a:lstStyle/>
+          <a:p>
+            <a:r>
+              <a:rPr lang="ko-KR" altLang="en-US" sz="3000" dirty="0"/>
+              <a:t>참고 자료</a:t>
+            </a:r>
+            <a:r>
+              <a:rPr lang="en-US" altLang="ko-KR" sz="3000" dirty="0"/>
+              <a:t>:</a:t>
+            </a:r>
+            <a:br>
+              <a:rPr lang="en-US" altLang="ko-KR" sz="3000" dirty="0"/>
+            </a:br>
+            <a:r>
+              <a:rPr lang="en-US" altLang="ko-KR" sz="3000" dirty="0">
+                <a:hlinkClick r:id="rId2"/>
+              </a:rPr>
+              <a:t>https://devsnote.com/writings/64</a:t>
+            </a:r>
+            <a:br>
+              <a:rPr lang="en-US" altLang="ko-KR" sz="3000" dirty="0"/>
+            </a:br>
+            <a:br>
+              <a:rPr lang="en-US" altLang="ko-KR" sz="3000" dirty="0"/>
+            </a:br>
+            <a:r>
+              <a:rPr lang="en-US" altLang="ko-KR" sz="3000" dirty="0">
+                <a:hlinkClick r:id="rId3"/>
+              </a:rPr>
+              <a:t>https://skuld2000.tistory.com/137</a:t>
+            </a:r>
+            <a:br>
+              <a:rPr lang="en-US" altLang="ko-KR" sz="3000" dirty="0"/>
+            </a:br>
+            <a:br>
+              <a:rPr lang="en-US" altLang="ko-KR" sz="3000" dirty="0"/>
+            </a:br>
+            <a:r>
+              <a:rPr lang="en-US" altLang="ko-KR" sz="3000" dirty="0">
+                <a:hlinkClick r:id="rId4"/>
+              </a:rPr>
+              <a:t>https://www.linux.co.kr/bbs/board.php?bo_table=lecture&amp;wr_id=2092</a:t>
+            </a:r>
+            <a:br>
+              <a:rPr lang="en-US" altLang="ko-KR" sz="3000" dirty="0"/>
+            </a:br>
+            <a:br>
+              <a:rPr lang="en-US" altLang="ko-KR" sz="3000" dirty="0"/>
+            </a:br>
+            <a:r>
+              <a:rPr lang="en-US" altLang="ko-KR" sz="3000" dirty="0"/>
+              <a:t>https://rhrhth23.tistory.com/30</a:t>
+            </a:r>
+            <a:br>
+              <a:rPr lang="en-US" altLang="ko-KR" sz="3000" dirty="0"/>
+            </a:br>
+            <a:br>
+              <a:rPr lang="en-US" altLang="ko-KR" sz="3000" dirty="0"/>
+            </a:br>
+            <a:endParaRPr lang="ko-KR" altLang="en-US" sz="3000" dirty="0"/>
+          </a:p>
+        </p:txBody>
+      </p:sp>
+    </p:spTree>
+    <p:extLst>
+      <p:ext uri="{BB962C8B-B14F-4D97-AF65-F5344CB8AC3E}">
+        <p14:creationId xmlns:p14="http://schemas.microsoft.com/office/powerpoint/2010/main" val="2005514429"/>
+      </p:ext>
+    </p:extLst>
+  </p:cSld>
+  <p:clrMapOvr>
+    <a:masterClrMapping/>
+  </p:clrMapOvr>
+</p:sld>
+</file>
+
 <file path=ppt/slides/slide5.xml><?xml version="1.0" encoding="utf-8"?>
 <p:sld xmlns:a="http://schemas.openxmlformats.org/drawingml/2006/main" xmlns:r="http://schemas.openxmlformats.org/officeDocument/2006/relationships" xmlns:p="http://schemas.openxmlformats.org/presentationml/2006/main">
   <p:cSld>

</xml_diff>